<commit_message>
update with data directions
</commit_message>
<xml_diff>
--- a/final_project/shiny_app_presentation.pptx
+++ b/final_project/shiny_app_presentation.pptx
@@ -5166,7 +5166,7 @@
         <p:spPr>
           <a:xfrm>
             <a:off x="836612" y="1396252"/>
-            <a:ext cx="11183938" cy="369332"/>
+            <a:ext cx="11183938" cy="646331"/>
           </a:xfrm>
           <a:prstGeom prst="rect">
             <a:avLst/>
@@ -5191,7 +5191,27 @@
             </a:r>
             <a:r>
               <a:rPr lang="en-US" dirty="0"/>
-              <a:t>.  Download it, open an </a:t>
+              <a:t>.  Download it and the dataset </a:t>
+            </a:r>
+            <a:r>
+              <a:rPr lang="en-US" dirty="0">
+                <a:hlinkClick r:id="rId6"/>
+              </a:rPr>
+              <a:t>life_expectancy_clean.csv</a:t>
+            </a:r>
+            <a:r>
+              <a:rPr lang="en-US" dirty="0"/>
+              <a:t> (make sure to change the location </a:t>
+            </a:r>
+            <a:r>
+              <a:rPr lang="en-US" dirty="0">
+                <a:hlinkClick r:id="rId7"/>
+              </a:rPr>
+              <a:t>here</a:t>
+            </a:r>
+            <a:r>
+              <a:rPr lang="en-US" dirty="0"/>
+              <a:t> on your local directory), open an </a:t>
             </a:r>
             <a:r>
               <a:rPr lang="en-US" dirty="0" err="1"/>

</xml_diff>